<commit_message>
some changes to data reduction files
</commit_message>
<xml_diff>
--- a/Presentations_Main/08_JWST_Observing_Mode_Coronagraphy.pptx
+++ b/Presentations_Main/08_JWST_Observing_Mode_Coronagraphy.pptx
@@ -475,7 +475,7 @@
           <a:p>
             <a:fld id="{57481A62-4CBA-4227-9B65-56B13E46FA16}" type="datetimeFigureOut">
               <a:rPr lang="en-GB" smtClean="0"/>
-              <a:t>29/11/2022</a:t>
+              <a:t>01/12/2022</a:t>
             </a:fld>
             <a:endParaRPr lang="en-GB"/>
           </a:p>
@@ -1443,7 +1443,7 @@
           </a:ln>
           <a:extLst>
             <a:ext uri="{C572A759-6A51-4108-AA02-DFA0A04FC94B}">
-              <ma14:wrappingTextBoxFlag xmlns:ma14="http://schemas.microsoft.com/office/mac/drawingml/2011/main" xmlns="" val="1"/>
+              <ma14:wrappingTextBoxFlag xmlns="" xmlns:ma14="http://schemas.microsoft.com/office/mac/drawingml/2011/main" val="1"/>
             </a:ext>
           </a:extLst>
         </p:spPr>
@@ -1940,7 +1940,7 @@
           </a:ln>
           <a:extLst>
             <a:ext uri="{C572A759-6A51-4108-AA02-DFA0A04FC94B}">
-              <ma14:wrappingTextBoxFlag xmlns:ma14="http://schemas.microsoft.com/office/mac/drawingml/2011/main" xmlns="" val="1"/>
+              <ma14:wrappingTextBoxFlag xmlns="" xmlns:ma14="http://schemas.microsoft.com/office/mac/drawingml/2011/main" val="1"/>
             </a:ext>
           </a:extLst>
         </p:spPr>
@@ -3051,7 +3051,7 @@
           </a:ln>
           <a:extLst>
             <a:ext uri="{C572A759-6A51-4108-AA02-DFA0A04FC94B}">
-              <ma14:wrappingTextBoxFlag xmlns:ma14="http://schemas.microsoft.com/office/mac/drawingml/2011/main" xmlns="" val="1"/>
+              <ma14:wrappingTextBoxFlag xmlns="" xmlns:ma14="http://schemas.microsoft.com/office/mac/drawingml/2011/main" val="1"/>
             </a:ext>
           </a:extLst>
         </p:spPr>
@@ -3448,7 +3448,7 @@
           </a:ln>
           <a:extLst>
             <a:ext uri="{C572A759-6A51-4108-AA02-DFA0A04FC94B}">
-              <ma14:wrappingTextBoxFlag xmlns:ma14="http://schemas.microsoft.com/office/mac/drawingml/2011/main" xmlns="" val="1"/>
+              <ma14:wrappingTextBoxFlag xmlns="" xmlns:ma14="http://schemas.microsoft.com/office/mac/drawingml/2011/main" val="1"/>
             </a:ext>
           </a:extLst>
         </p:spPr>
@@ -3645,7 +3645,7 @@
           </a:ln>
           <a:extLst>
             <a:ext uri="{C572A759-6A51-4108-AA02-DFA0A04FC94B}">
-              <ma14:wrappingTextBoxFlag xmlns:ma14="http://schemas.microsoft.com/office/mac/drawingml/2011/main" xmlns="" val="1"/>
+              <ma14:wrappingTextBoxFlag xmlns="" xmlns:ma14="http://schemas.microsoft.com/office/mac/drawingml/2011/main" val="1"/>
             </a:ext>
           </a:extLst>
         </p:spPr>
@@ -4540,7 +4540,7 @@
           <a:p>
             <a:r>
               <a:rPr lang="en-US" sz="3600" dirty="0"/>
-              <a:t>Themiya Nanayakkara</a:t>
+              <a:t>Colin Jacobs</a:t>
             </a:r>
           </a:p>
         </p:txBody>
@@ -6825,7 +6825,7 @@
           </a:prstGeom>
           <a:extLst>
             <a:ext uri="{C572A759-6A51-4108-AA02-DFA0A04FC94B}">
-              <ma14:wrappingTextBoxFlag xmlns:ma14="http://schemas.microsoft.com/office/mac/drawingml/2011/main" xmlns="" val="1"/>
+              <ma14:wrappingTextBoxFlag xmlns="" xmlns:ma14="http://schemas.microsoft.com/office/mac/drawingml/2011/main" val="1"/>
             </a:ext>
           </a:extLst>
         </p:spPr>

</xml_diff>